<commit_message>
fixed a typo in lab 4 pptx
</commit_message>
<xml_diff>
--- a/Lab 4/CS 341 Lab 4.pptx
+++ b/Lab 4/CS 341 Lab 4.pptx
@@ -4470,7 +4470,15 @@
             </a:pPr>
             <a:r>
               <a:rPr lang="en-US" dirty="0"/>
-              <a:t> We can access this memory without any special functions (such as in() and out()</a:t>
+              <a:t> We can access this memory without any special </a:t>
+            </a:r>
+            <a:r>
+              <a:rPr lang="en-US"/>
+              <a:t>functions such </a:t>
+            </a:r>
+            <a:r>
+              <a:rPr lang="en-US" dirty="0"/>
+              <a:t>as in() and out()</a:t>
             </a:r>
           </a:p>
         </p:txBody>
@@ -5673,7 +5681,7 @@
 </file>
 
 <file path=ppt/slides/slide6.xml><?xml version="1.0" encoding="utf-8"?>
-<p:sld xmlns:a="http://schemas.openxmlformats.org/drawingml/2006/main" xmlns:r="http://schemas.openxmlformats.org/officeDocument/2006/relationships" xmlns:p="http://schemas.openxmlformats.org/presentationml/2006/main">
+<p:sld xmlns:a="http://schemas.openxmlformats.org/drawingml/2006/main" xmlns:r="http://schemas.openxmlformats.org/officeDocument/2006/relationships" xmlns:p="http://schemas.openxmlformats.org/presentationml/2006/main" show="0">
   <p:cSld>
     <p:spTree>
       <p:nvGrpSpPr>

</xml_diff>

<commit_message>
switched to 0b format in lab 4 presentation
</commit_message>
<xml_diff>
--- a/Lab 4/CS 341 Lab 4.pptx
+++ b/Lab 4/CS 341 Lab 4.pptx
@@ -6578,10 +6578,10 @@
       </p:sp>
       <p:pic>
         <p:nvPicPr>
-          <p:cNvPr id="5" name="Picture 4">
+          <p:cNvPr id="6" name="Picture 5">
             <a:extLst>
               <a:ext uri="{FF2B5EF4-FFF2-40B4-BE49-F238E27FC236}">
-                <a16:creationId xmlns:a16="http://schemas.microsoft.com/office/drawing/2014/main" id="{A296E16D-3578-492B-BDB6-FB46F7BDA981}"/>
+                <a16:creationId xmlns:a16="http://schemas.microsoft.com/office/drawing/2014/main" id="{A5488D3C-440F-4BDC-9464-F555890FB8EC}"/>
               </a:ext>
             </a:extLst>
           </p:cNvPr>
@@ -6598,8 +6598,8 @@
         </p:blipFill>
         <p:spPr>
           <a:xfrm>
-            <a:off x="1696636" y="3170100"/>
-            <a:ext cx="3814451" cy="517799"/>
+            <a:off x="1514582" y="3156479"/>
+            <a:ext cx="3603828" cy="576613"/>
           </a:xfrm>
           <a:prstGeom prst="rect">
             <a:avLst/>
@@ -6608,10 +6608,10 @@
       </p:pic>
       <p:pic>
         <p:nvPicPr>
-          <p:cNvPr id="9" name="Picture 8" descr="Text&#10;&#10;Description automatically generated">
+          <p:cNvPr id="8" name="Picture 7" descr="Text&#10;&#10;Description automatically generated">
             <a:extLst>
               <a:ext uri="{FF2B5EF4-FFF2-40B4-BE49-F238E27FC236}">
-                <a16:creationId xmlns:a16="http://schemas.microsoft.com/office/drawing/2014/main" id="{1D5ACE62-339C-4E6C-9F74-521DCE0B7F65}"/>
+                <a16:creationId xmlns:a16="http://schemas.microsoft.com/office/drawing/2014/main" id="{FA2EDEF1-D50D-4ACA-BD3F-398E3CDB0E2D}"/>
               </a:ext>
             </a:extLst>
           </p:cNvPr>
@@ -6620,16 +6620,15 @@
           </p:cNvPicPr>
           <p:nvPr/>
         </p:nvPicPr>
-        <p:blipFill>
+        <p:blipFill rotWithShape="1">
           <a:blip r:embed="rId3"/>
-          <a:stretch>
-            <a:fillRect/>
-          </a:stretch>
+          <a:srcRect b="6518"/>
+          <a:stretch/>
         </p:blipFill>
         <p:spPr>
           <a:xfrm>
-            <a:off x="1696636" y="4765537"/>
-            <a:ext cx="3729429" cy="1300599"/>
+            <a:off x="1514581" y="4616924"/>
+            <a:ext cx="3590563" cy="1170560"/>
           </a:xfrm>
           <a:prstGeom prst="rect">
             <a:avLst/>

</xml_diff>